<commit_message>
Updated our CellML Workshop 2012 presentation.
</commit_message>
<xml_diff>
--- a/doc/res/dissemination/2012-03-12-CellmlWorkshop2012-WaihekeIsland-NewZealand.pptx
+++ b/doc/res/dissemination/2012-03-12-CellmlWorkshop2012-WaihekeIsland-NewZealand.pptx
@@ -1161,7 +1161,7 @@
             <a:fld id="{F70480A6-312C-465E-873E-88FE80E6C429}" type="datetime1">
               <a:rPr lang="de-DE"/>
               <a:pPr/>
-              <a:t>12.03.2012</a:t>
+              <a:t>25.04.2012</a:t>
             </a:fld>
             <a:endParaRPr lang="de-DE"/>
           </a:p>
@@ -1324,7 +1324,7 @@
             <a:fld id="{B3C38792-965B-4FB4-B134-553DE091EC98}" type="datetime1">
               <a:rPr lang="de-DE"/>
               <a:pPr/>
-              <a:t>12.03.2012</a:t>
+              <a:t>25.04.2012</a:t>
             </a:fld>
             <a:endParaRPr lang="de-DE"/>
           </a:p>
@@ -1527,7 +1527,7 @@
             <a:fld id="{10316656-2CC4-4D69-80F4-824F711315BD}" type="datetime1">
               <a:rPr lang="de-DE"/>
               <a:pPr/>
-              <a:t>12.03.2012</a:t>
+              <a:t>25.04.2012</a:t>
             </a:fld>
             <a:endParaRPr lang="de-DE"/>
           </a:p>
@@ -1787,7 +1787,7 @@
             <a:fld id="{C4481FCE-D98A-451F-BC61-6AAE7E44413F}" type="datetime1">
               <a:rPr lang="de-DE"/>
               <a:pPr/>
-              <a:t>12.03.2012</a:t>
+              <a:t>25.04.2012</a:t>
             </a:fld>
             <a:endParaRPr lang="de-DE"/>
           </a:p>
@@ -1980,7 +1980,7 @@
             <a:fld id="{FC4AF9E0-57DA-4A92-99A8-08E13B862A60}" type="datetime1">
               <a:rPr lang="de-DE"/>
               <a:pPr/>
-              <a:t>12.03.2012</a:t>
+              <a:t>25.04.2012</a:t>
             </a:fld>
             <a:endParaRPr lang="de-DE"/>
           </a:p>
@@ -2195,7 +2195,7 @@
             <a:fld id="{8C7EA83F-DAF8-4196-9807-A841A81E2858}" type="datetime1">
               <a:rPr lang="de-DE"/>
               <a:pPr/>
-              <a:t>12.03.2012</a:t>
+              <a:t>25.04.2012</a:t>
             </a:fld>
             <a:endParaRPr lang="de-DE"/>
           </a:p>
@@ -2506,7 +2506,7 @@
             <a:fld id="{E176F79F-2D17-4567-8739-CEF0FA0D239E}" type="datetime1">
               <a:rPr lang="de-DE"/>
               <a:pPr/>
-              <a:t>12.03.2012</a:t>
+              <a:t>25.04.2012</a:t>
             </a:fld>
             <a:endParaRPr lang="de-DE"/>
           </a:p>
@@ -2956,7 +2956,7 @@
             <a:fld id="{D5562EBB-FF3C-4CCA-88E4-BFF1D9E8B810}" type="datetime1">
               <a:rPr lang="de-DE"/>
               <a:pPr/>
-              <a:t>12.03.2012</a:t>
+              <a:t>25.04.2012</a:t>
             </a:fld>
             <a:endParaRPr lang="de-DE"/>
           </a:p>
@@ -3097,7 +3097,7 @@
             <a:fld id="{04CB94AF-DDEF-4B17-8DAD-D644A0B3ADE6}" type="datetime1">
               <a:rPr lang="de-DE"/>
               <a:pPr/>
-              <a:t>12.03.2012</a:t>
+              <a:t>25.04.2012</a:t>
             </a:fld>
             <a:endParaRPr lang="de-DE"/>
           </a:p>
@@ -3215,7 +3215,7 @@
             <a:fld id="{BE76D6BA-8F7D-4227-80E1-7C305C3BD958}" type="datetime1">
               <a:rPr lang="de-DE"/>
               <a:pPr/>
-              <a:t>12.03.2012</a:t>
+              <a:t>25.04.2012</a:t>
             </a:fld>
             <a:endParaRPr lang="de-DE"/>
           </a:p>
@@ -3515,7 +3515,7 @@
             <a:fld id="{26134597-A25C-4F07-828B-4FFAD5625756}" type="datetime1">
               <a:rPr lang="de-DE"/>
               <a:pPr/>
-              <a:t>12.03.2012</a:t>
+              <a:t>25.04.2012</a:t>
             </a:fld>
             <a:endParaRPr lang="de-DE"/>
           </a:p>
@@ -3792,7 +3792,7 @@
             <a:fld id="{7CF39A1C-8A2E-4299-A499-6D04DA8AA3AA}" type="datetime1">
               <a:rPr lang="de-DE"/>
               <a:pPr/>
-              <a:t>12.03.2012</a:t>
+              <a:t>25.04.2012</a:t>
             </a:fld>
             <a:endParaRPr lang="de-DE"/>
           </a:p>
@@ -4190,7 +4190,7 @@
             <a:fld id="{CC569BC7-1E92-455A-A516-4577B683ADD5}" type="datetime1">
               <a:rPr lang="de-DE"/>
               <a:pPr/>
-              <a:t>12.03.2012</a:t>
+              <a:t>25.04.2012</a:t>
             </a:fld>
             <a:endParaRPr lang="de-DE"/>
           </a:p>
@@ -4872,10 +4872,10 @@
           <a:lstStyle/>
           <a:p>
             <a:r>
-              <a:rPr lang="de-DE" smtClean="0"/>
-              <a:t>ChEBI – Chemical Entities of Biological Interest</a:t>
-            </a:r>
-            <a:endParaRPr lang="de-DE"/>
+              <a:rPr lang="de-DE" dirty="0"/>
+              <a:t>OpenCOR</a:t>
+            </a:r>
+            <a:endParaRPr lang="de-DE" dirty="0"/>
           </a:p>
         </p:txBody>
       </p:sp>
@@ -5489,10 +5489,10 @@
           <a:lstStyle/>
           <a:p>
             <a:r>
-              <a:rPr lang="de-DE" smtClean="0"/>
-              <a:t>ChEBI – Chemical Entities of Biological Interest</a:t>
-            </a:r>
-            <a:endParaRPr lang="de-DE"/>
+              <a:rPr lang="de-DE" dirty="0"/>
+              <a:t>OpenCOR</a:t>
+            </a:r>
+            <a:endParaRPr lang="de-DE" dirty="0"/>
           </a:p>
         </p:txBody>
       </p:sp>
@@ -6195,10 +6195,10 @@
           <a:lstStyle/>
           <a:p>
             <a:r>
-              <a:rPr lang="de-DE" smtClean="0"/>
-              <a:t>ChEBI – Chemical Entities of Biological Interest</a:t>
-            </a:r>
-            <a:endParaRPr lang="de-DE"/>
+              <a:rPr lang="de-DE" dirty="0"/>
+              <a:t>OpenCOR</a:t>
+            </a:r>
+            <a:endParaRPr lang="de-DE" dirty="0"/>
           </a:p>
         </p:txBody>
       </p:sp>
@@ -6906,10 +6906,10 @@
           <a:lstStyle/>
           <a:p>
             <a:r>
-              <a:rPr lang="de-DE" smtClean="0"/>
-              <a:t>ChEBI – Chemical Entities of Biological Interest</a:t>
-            </a:r>
-            <a:endParaRPr lang="de-DE"/>
+              <a:rPr lang="de-DE" dirty="0" smtClean="0"/>
+              <a:t>OpenCOR</a:t>
+            </a:r>
+            <a:endParaRPr lang="de-DE" dirty="0"/>
           </a:p>
         </p:txBody>
       </p:sp>
@@ -7339,7 +7339,6 @@
               <a:rPr lang="en-GB" dirty="0" smtClean="0"/>
               <a:t>.</a:t>
             </a:r>
-            <a:endParaRPr lang="en-GB" dirty="0" smtClean="0"/>
           </a:p>
           <a:p>
             <a:pPr marL="0" indent="0" algn="ctr">
@@ -7511,10 +7510,10 @@
           <a:lstStyle/>
           <a:p>
             <a:r>
-              <a:rPr lang="de-DE" smtClean="0"/>
-              <a:t>ChEBI – Chemical Entities of Biological Interest</a:t>
-            </a:r>
-            <a:endParaRPr lang="de-DE"/>
+              <a:rPr lang="de-DE" dirty="0"/>
+              <a:t>OpenCOR</a:t>
+            </a:r>
+            <a:endParaRPr lang="de-DE" dirty="0"/>
           </a:p>
         </p:txBody>
       </p:sp>
@@ -8563,10 +8562,10 @@
           <a:lstStyle/>
           <a:p>
             <a:r>
-              <a:rPr lang="de-DE" smtClean="0"/>
-              <a:t>ChEBI – Chemical Entities of Biological Interest</a:t>
-            </a:r>
-            <a:endParaRPr lang="de-DE"/>
+              <a:rPr lang="de-DE" dirty="0"/>
+              <a:t>OpenCOR</a:t>
+            </a:r>
+            <a:endParaRPr lang="de-DE" dirty="0"/>
           </a:p>
         </p:txBody>
       </p:sp>
@@ -9460,10 +9459,10 @@
           <a:lstStyle/>
           <a:p>
             <a:r>
-              <a:rPr lang="de-DE" smtClean="0"/>
-              <a:t>ChEBI – Chemical Entities of Biological Interest</a:t>
-            </a:r>
-            <a:endParaRPr lang="de-DE"/>
+              <a:rPr lang="de-DE" dirty="0"/>
+              <a:t>OpenCOR</a:t>
+            </a:r>
+            <a:endParaRPr lang="de-DE" dirty="0"/>
           </a:p>
         </p:txBody>
       </p:sp>
@@ -10223,10 +10222,10 @@
           <a:lstStyle/>
           <a:p>
             <a:r>
-              <a:rPr lang="de-DE" smtClean="0"/>
-              <a:t>ChEBI – Chemical Entities of Biological Interest</a:t>
-            </a:r>
-            <a:endParaRPr lang="de-DE"/>
+              <a:rPr lang="de-DE" dirty="0"/>
+              <a:t>OpenCOR</a:t>
+            </a:r>
+            <a:endParaRPr lang="de-DE" dirty="0"/>
           </a:p>
         </p:txBody>
       </p:sp>
@@ -10884,10 +10883,10 @@
           <a:lstStyle/>
           <a:p>
             <a:r>
-              <a:rPr lang="de-DE" smtClean="0"/>
-              <a:t>ChEBI – Chemical Entities of Biological Interest</a:t>
-            </a:r>
-            <a:endParaRPr lang="de-DE"/>
+              <a:rPr lang="de-DE" dirty="0"/>
+              <a:t>OpenCOR</a:t>
+            </a:r>
+            <a:endParaRPr lang="de-DE" dirty="0"/>
           </a:p>
         </p:txBody>
       </p:sp>
@@ -11675,10 +11674,10 @@
           <a:lstStyle/>
           <a:p>
             <a:r>
-              <a:rPr lang="de-DE" smtClean="0"/>
-              <a:t>ChEBI – Chemical Entities of Biological Interest</a:t>
-            </a:r>
-            <a:endParaRPr lang="de-DE"/>
+              <a:rPr lang="de-DE" dirty="0"/>
+              <a:t>OpenCOR</a:t>
+            </a:r>
+            <a:endParaRPr lang="de-DE" dirty="0"/>
           </a:p>
         </p:txBody>
       </p:sp>
@@ -12519,10 +12518,10 @@
           <a:lstStyle/>
           <a:p>
             <a:r>
-              <a:rPr lang="de-DE" smtClean="0"/>
-              <a:t>ChEBI – Chemical Entities of Biological Interest</a:t>
-            </a:r>
-            <a:endParaRPr lang="de-DE"/>
+              <a:rPr lang="de-DE" dirty="0"/>
+              <a:t>OpenCOR</a:t>
+            </a:r>
+            <a:endParaRPr lang="de-DE" dirty="0"/>
           </a:p>
         </p:txBody>
       </p:sp>

</xml_diff>